<commit_message>
PSA Fix some typos, clean up a few things, progress towards v1.0
</commit_message>
<xml_diff>
--- a/p4-16/psa/figs/psa-instantiation-tree-figure.pptx
+++ b/p4-16/psa/figs/psa-instantiation-tree-figure.pptx
@@ -2,12 +2,12 @@
 <file path=ppt/presentation.xml><?xml version="1.0" encoding="utf-8"?>
 <p:presentation xmlns:a="http://schemas.openxmlformats.org/drawingml/2006/main" xmlns:r="http://schemas.openxmlformats.org/officeDocument/2006/relationships" xmlns:p="http://schemas.openxmlformats.org/presentationml/2006/main" saveSubsetFonts="1" autoCompressPictures="0">
   <p:sldMasterIdLst>
-    <p:sldMasterId id="2147483672" r:id="rId1"/>
+    <p:sldMasterId id="2147483684" r:id="rId1"/>
   </p:sldMasterIdLst>
   <p:sldIdLst>
     <p:sldId id="257" r:id="rId2"/>
   </p:sldIdLst>
-  <p:sldSz cx="10058400" cy="4572000"/>
+  <p:sldSz cx="10058400" cy="3200400"/>
   <p:notesSz cx="6858000" cy="9144000"/>
   <p:defaultTextStyle>
     <a:defPPr>
@@ -104,6 +104,11 @@
       </a:defRPr>
     </a:lvl9pPr>
   </p:defaultTextStyle>
+  <p:extLst>
+    <p:ext uri="{EFAFB233-063F-42B5-8137-9DF3F51BA10A}">
+      <p15:sldGuideLst xmlns:p15="http://schemas.microsoft.com/office/powerpoint/2012/main"/>
+    </p:ext>
+  </p:extLst>
 </p:presentation>
 </file>
 
@@ -136,20 +141,20 @@
         </p:nvSpPr>
         <p:spPr>
           <a:xfrm>
-            <a:off x="1257300" y="748242"/>
-            <a:ext cx="7543800" cy="1591733"/>
+            <a:off x="1257300" y="523770"/>
+            <a:ext cx="7543800" cy="1114213"/>
           </a:xfrm>
         </p:spPr>
         <p:txBody>
           <a:bodyPr anchor="b"/>
           <a:lstStyle>
             <a:lvl1pPr algn="ctr">
-              <a:defRPr sz="4000"/>
+              <a:defRPr sz="2800"/>
             </a:lvl1pPr>
           </a:lstStyle>
           <a:p>
             <a:r>
-              <a:rPr lang="en-US" smtClean="0"/>
+              <a:rPr lang="en-US"/>
               <a:t>Click to edit Master title style</a:t>
             </a:r>
             <a:endParaRPr lang="en-US" dirty="0"/>
@@ -168,8 +173,8 @@
         </p:nvSpPr>
         <p:spPr>
           <a:xfrm>
-            <a:off x="1257300" y="2401359"/>
-            <a:ext cx="7543800" cy="1103841"/>
+            <a:off x="1257300" y="1680951"/>
+            <a:ext cx="7543800" cy="772689"/>
           </a:xfrm>
         </p:spPr>
         <p:txBody>
@@ -177,44 +182,44 @@
           <a:lstStyle>
             <a:lvl1pPr marL="0" indent="0" algn="ctr">
               <a:buNone/>
-              <a:defRPr sz="1600"/>
+              <a:defRPr sz="1120"/>
             </a:lvl1pPr>
-            <a:lvl2pPr marL="304815" indent="0" algn="ctr">
-              <a:buNone/>
-              <a:defRPr sz="1333"/>
+            <a:lvl2pPr marL="213375" indent="0" algn="ctr">
+              <a:buNone/>
+              <a:defRPr sz="933"/>
             </a:lvl2pPr>
-            <a:lvl3pPr marL="609630" indent="0" algn="ctr">
-              <a:buNone/>
-              <a:defRPr sz="1200"/>
+            <a:lvl3pPr marL="426750" indent="0" algn="ctr">
+              <a:buNone/>
+              <a:defRPr sz="840"/>
             </a:lvl3pPr>
-            <a:lvl4pPr marL="914446" indent="0" algn="ctr">
-              <a:buNone/>
-              <a:defRPr sz="1067"/>
+            <a:lvl4pPr marL="640126" indent="0" algn="ctr">
+              <a:buNone/>
+              <a:defRPr sz="747"/>
             </a:lvl4pPr>
-            <a:lvl5pPr marL="1219261" indent="0" algn="ctr">
-              <a:buNone/>
-              <a:defRPr sz="1067"/>
+            <a:lvl5pPr marL="853501" indent="0" algn="ctr">
+              <a:buNone/>
+              <a:defRPr sz="747"/>
             </a:lvl5pPr>
-            <a:lvl6pPr marL="1524076" indent="0" algn="ctr">
-              <a:buNone/>
-              <a:defRPr sz="1067"/>
+            <a:lvl6pPr marL="1066876" indent="0" algn="ctr">
+              <a:buNone/>
+              <a:defRPr sz="747"/>
             </a:lvl6pPr>
-            <a:lvl7pPr marL="1828891" indent="0" algn="ctr">
-              <a:buNone/>
-              <a:defRPr sz="1067"/>
+            <a:lvl7pPr marL="1280251" indent="0" algn="ctr">
+              <a:buNone/>
+              <a:defRPr sz="747"/>
             </a:lvl7pPr>
-            <a:lvl8pPr marL="2133707" indent="0" algn="ctr">
-              <a:buNone/>
-              <a:defRPr sz="1067"/>
+            <a:lvl8pPr marL="1493627" indent="0" algn="ctr">
+              <a:buNone/>
+              <a:defRPr sz="747"/>
             </a:lvl8pPr>
-            <a:lvl9pPr marL="2438522" indent="0" algn="ctr">
-              <a:buNone/>
-              <a:defRPr sz="1067"/>
+            <a:lvl9pPr marL="1707002" indent="0" algn="ctr">
+              <a:buNone/>
+              <a:defRPr sz="747"/>
             </a:lvl9pPr>
           </a:lstStyle>
           <a:p>
             <a:r>
-              <a:rPr lang="en-US" smtClean="0"/>
+              <a:rPr lang="en-US"/>
               <a:t>Click to edit Master subtitle style</a:t>
             </a:r>
             <a:endParaRPr lang="en-US" dirty="0"/>
@@ -238,7 +243,7 @@
           <a:p>
             <a:fld id="{49B0FEE6-A755-164F-8F3C-12C9C2B69E35}" type="datetimeFigureOut">
               <a:rPr lang="en-US" smtClean="0"/>
-              <a:t>11/3/17</a:t>
+              <a:t>2/10/18</a:t>
             </a:fld>
             <a:endParaRPr lang="en-US"/>
           </a:p>
@@ -287,6 +292,11 @@
         </p:txBody>
       </p:sp>
     </p:spTree>
+    <p:extLst>
+      <p:ext uri="{BB962C8B-B14F-4D97-AF65-F5344CB8AC3E}">
+        <p14:creationId xmlns:p14="http://schemas.microsoft.com/office/powerpoint/2010/main" val="2808713303"/>
+      </p:ext>
+    </p:extLst>
   </p:cSld>
   <p:clrMapOvr>
     <a:masterClrMapping/>
@@ -327,7 +337,7 @@
           <a:lstStyle/>
           <a:p>
             <a:r>
-              <a:rPr lang="en-US" smtClean="0"/>
+              <a:rPr lang="en-US"/>
               <a:t>Click to edit Master title style</a:t>
             </a:r>
             <a:endParaRPr lang="en-US" dirty="0"/>
@@ -351,35 +361,35 @@
           <a:p>
             <a:pPr lvl="0"/>
             <a:r>
-              <a:rPr lang="en-US" smtClean="0"/>
-              <a:t>Click to edit Master text styles</a:t>
+              <a:rPr lang="en-US"/>
+              <a:t>Edit Master text styles</a:t>
             </a:r>
           </a:p>
           <a:p>
             <a:pPr lvl="1"/>
             <a:r>
-              <a:rPr lang="en-US" smtClean="0"/>
+              <a:rPr lang="en-US"/>
               <a:t>Second level</a:t>
             </a:r>
           </a:p>
           <a:p>
             <a:pPr lvl="2"/>
             <a:r>
-              <a:rPr lang="en-US" smtClean="0"/>
+              <a:rPr lang="en-US"/>
               <a:t>Third level</a:t>
             </a:r>
           </a:p>
           <a:p>
             <a:pPr lvl="3"/>
             <a:r>
-              <a:rPr lang="en-US" smtClean="0"/>
+              <a:rPr lang="en-US"/>
               <a:t>Fourth level</a:t>
             </a:r>
           </a:p>
           <a:p>
             <a:pPr lvl="4"/>
             <a:r>
-              <a:rPr lang="en-US" smtClean="0"/>
+              <a:rPr lang="en-US"/>
               <a:t>Fifth level</a:t>
             </a:r>
             <a:endParaRPr lang="en-US" dirty="0"/>
@@ -403,7 +413,7 @@
           <a:p>
             <a:fld id="{49B0FEE6-A755-164F-8F3C-12C9C2B69E35}" type="datetimeFigureOut">
               <a:rPr lang="en-US" smtClean="0"/>
-              <a:t>11/3/17</a:t>
+              <a:t>2/10/18</a:t>
             </a:fld>
             <a:endParaRPr lang="en-US"/>
           </a:p>
@@ -452,6 +462,11 @@
         </p:txBody>
       </p:sp>
     </p:spTree>
+    <p:extLst>
+      <p:ext uri="{BB962C8B-B14F-4D97-AF65-F5344CB8AC3E}">
+        <p14:creationId xmlns:p14="http://schemas.microsoft.com/office/powerpoint/2010/main" val="4040973503"/>
+      </p:ext>
+    </p:extLst>
   </p:cSld>
   <p:clrMapOvr>
     <a:masterClrMapping/>
@@ -488,8 +503,8 @@
         </p:nvSpPr>
         <p:spPr>
           <a:xfrm>
-            <a:off x="7198042" y="243417"/>
-            <a:ext cx="2168843" cy="3874559"/>
+            <a:off x="7198042" y="170392"/>
+            <a:ext cx="2168843" cy="2712191"/>
           </a:xfrm>
         </p:spPr>
         <p:txBody>
@@ -497,7 +512,7 @@
           <a:lstStyle/>
           <a:p>
             <a:r>
-              <a:rPr lang="en-US" smtClean="0"/>
+              <a:rPr lang="en-US"/>
               <a:t>Click to edit Master title style</a:t>
             </a:r>
             <a:endParaRPr lang="en-US" dirty="0"/>
@@ -516,8 +531,8 @@
         </p:nvSpPr>
         <p:spPr>
           <a:xfrm>
-            <a:off x="691515" y="243417"/>
-            <a:ext cx="6380798" cy="3874559"/>
+            <a:off x="691515" y="170392"/>
+            <a:ext cx="6380798" cy="2712191"/>
           </a:xfrm>
         </p:spPr>
         <p:txBody>
@@ -526,35 +541,35 @@
           <a:p>
             <a:pPr lvl="0"/>
             <a:r>
-              <a:rPr lang="en-US" smtClean="0"/>
-              <a:t>Click to edit Master text styles</a:t>
+              <a:rPr lang="en-US"/>
+              <a:t>Edit Master text styles</a:t>
             </a:r>
           </a:p>
           <a:p>
             <a:pPr lvl="1"/>
             <a:r>
-              <a:rPr lang="en-US" smtClean="0"/>
+              <a:rPr lang="en-US"/>
               <a:t>Second level</a:t>
             </a:r>
           </a:p>
           <a:p>
             <a:pPr lvl="2"/>
             <a:r>
-              <a:rPr lang="en-US" smtClean="0"/>
+              <a:rPr lang="en-US"/>
               <a:t>Third level</a:t>
             </a:r>
           </a:p>
           <a:p>
             <a:pPr lvl="3"/>
             <a:r>
-              <a:rPr lang="en-US" smtClean="0"/>
+              <a:rPr lang="en-US"/>
               <a:t>Fourth level</a:t>
             </a:r>
           </a:p>
           <a:p>
             <a:pPr lvl="4"/>
             <a:r>
-              <a:rPr lang="en-US" smtClean="0"/>
+              <a:rPr lang="en-US"/>
               <a:t>Fifth level</a:t>
             </a:r>
             <a:endParaRPr lang="en-US" dirty="0"/>
@@ -578,7 +593,7 @@
           <a:p>
             <a:fld id="{49B0FEE6-A755-164F-8F3C-12C9C2B69E35}" type="datetimeFigureOut">
               <a:rPr lang="en-US" smtClean="0"/>
-              <a:t>11/3/17</a:t>
+              <a:t>2/10/18</a:t>
             </a:fld>
             <a:endParaRPr lang="en-US"/>
           </a:p>
@@ -627,6 +642,11 @@
         </p:txBody>
       </p:sp>
     </p:spTree>
+    <p:extLst>
+      <p:ext uri="{BB962C8B-B14F-4D97-AF65-F5344CB8AC3E}">
+        <p14:creationId xmlns:p14="http://schemas.microsoft.com/office/powerpoint/2010/main" val="1078984590"/>
+      </p:ext>
+    </p:extLst>
   </p:cSld>
   <p:clrMapOvr>
     <a:masterClrMapping/>
@@ -667,7 +687,7 @@
           <a:lstStyle/>
           <a:p>
             <a:r>
-              <a:rPr lang="en-US" smtClean="0"/>
+              <a:rPr lang="en-US"/>
               <a:t>Click to edit Master title style</a:t>
             </a:r>
             <a:endParaRPr lang="en-US" dirty="0"/>
@@ -691,35 +711,35 @@
           <a:p>
             <a:pPr lvl="0"/>
             <a:r>
-              <a:rPr lang="en-US" smtClean="0"/>
-              <a:t>Click to edit Master text styles</a:t>
+              <a:rPr lang="en-US"/>
+              <a:t>Edit Master text styles</a:t>
             </a:r>
           </a:p>
           <a:p>
             <a:pPr lvl="1"/>
             <a:r>
-              <a:rPr lang="en-US" smtClean="0"/>
+              <a:rPr lang="en-US"/>
               <a:t>Second level</a:t>
             </a:r>
           </a:p>
           <a:p>
             <a:pPr lvl="2"/>
             <a:r>
-              <a:rPr lang="en-US" smtClean="0"/>
+              <a:rPr lang="en-US"/>
               <a:t>Third level</a:t>
             </a:r>
           </a:p>
           <a:p>
             <a:pPr lvl="3"/>
             <a:r>
-              <a:rPr lang="en-US" smtClean="0"/>
+              <a:rPr lang="en-US"/>
               <a:t>Fourth level</a:t>
             </a:r>
           </a:p>
           <a:p>
             <a:pPr lvl="4"/>
             <a:r>
-              <a:rPr lang="en-US" smtClean="0"/>
+              <a:rPr lang="en-US"/>
               <a:t>Fifth level</a:t>
             </a:r>
             <a:endParaRPr lang="en-US" dirty="0"/>
@@ -743,7 +763,7 @@
           <a:p>
             <a:fld id="{49B0FEE6-A755-164F-8F3C-12C9C2B69E35}" type="datetimeFigureOut">
               <a:rPr lang="en-US" smtClean="0"/>
-              <a:t>11/3/17</a:t>
+              <a:t>2/10/18</a:t>
             </a:fld>
             <a:endParaRPr lang="en-US"/>
           </a:p>
@@ -792,6 +812,11 @@
         </p:txBody>
       </p:sp>
     </p:spTree>
+    <p:extLst>
+      <p:ext uri="{BB962C8B-B14F-4D97-AF65-F5344CB8AC3E}">
+        <p14:creationId xmlns:p14="http://schemas.microsoft.com/office/powerpoint/2010/main" val="2098696819"/>
+      </p:ext>
+    </p:extLst>
   </p:cSld>
   <p:clrMapOvr>
     <a:masterClrMapping/>
@@ -828,20 +853,20 @@
         </p:nvSpPr>
         <p:spPr>
           <a:xfrm>
-            <a:off x="686276" y="1139826"/>
-            <a:ext cx="8675370" cy="1901825"/>
+            <a:off x="686276" y="797878"/>
+            <a:ext cx="8675370" cy="1331277"/>
           </a:xfrm>
         </p:spPr>
         <p:txBody>
           <a:bodyPr anchor="b"/>
           <a:lstStyle>
             <a:lvl1pPr>
-              <a:defRPr sz="4000"/>
+              <a:defRPr sz="2800"/>
             </a:lvl1pPr>
           </a:lstStyle>
           <a:p>
             <a:r>
-              <a:rPr lang="en-US" smtClean="0"/>
+              <a:rPr lang="en-US"/>
               <a:t>Click to edit Master title style</a:t>
             </a:r>
             <a:endParaRPr lang="en-US" dirty="0"/>
@@ -860,8 +885,8 @@
         </p:nvSpPr>
         <p:spPr>
           <a:xfrm>
-            <a:off x="686276" y="3059642"/>
-            <a:ext cx="8675370" cy="1000125"/>
+            <a:off x="686276" y="2141750"/>
+            <a:ext cx="8675370" cy="700087"/>
           </a:xfrm>
         </p:spPr>
         <p:txBody>
@@ -869,7 +894,7 @@
           <a:lstStyle>
             <a:lvl1pPr marL="0" indent="0">
               <a:buNone/>
-              <a:defRPr sz="1600">
+              <a:defRPr sz="1120">
                 <a:solidFill>
                   <a:schemeClr val="tx1">
                     <a:tint val="75000"/>
@@ -877,9 +902,9 @@
                 </a:solidFill>
               </a:defRPr>
             </a:lvl1pPr>
-            <a:lvl2pPr marL="304815" indent="0">
-              <a:buNone/>
-              <a:defRPr sz="1333">
+            <a:lvl2pPr marL="213375" indent="0">
+              <a:buNone/>
+              <a:defRPr sz="933">
                 <a:solidFill>
                   <a:schemeClr val="tx1">
                     <a:tint val="75000"/>
@@ -887,9 +912,9 @@
                 </a:solidFill>
               </a:defRPr>
             </a:lvl2pPr>
-            <a:lvl3pPr marL="609630" indent="0">
-              <a:buNone/>
-              <a:defRPr sz="1200">
+            <a:lvl3pPr marL="426750" indent="0">
+              <a:buNone/>
+              <a:defRPr sz="840">
                 <a:solidFill>
                   <a:schemeClr val="tx1">
                     <a:tint val="75000"/>
@@ -897,9 +922,9 @@
                 </a:solidFill>
               </a:defRPr>
             </a:lvl3pPr>
-            <a:lvl4pPr marL="914446" indent="0">
-              <a:buNone/>
-              <a:defRPr sz="1067">
+            <a:lvl4pPr marL="640126" indent="0">
+              <a:buNone/>
+              <a:defRPr sz="747">
                 <a:solidFill>
                   <a:schemeClr val="tx1">
                     <a:tint val="75000"/>
@@ -907,9 +932,9 @@
                 </a:solidFill>
               </a:defRPr>
             </a:lvl4pPr>
-            <a:lvl5pPr marL="1219261" indent="0">
-              <a:buNone/>
-              <a:defRPr sz="1067">
+            <a:lvl5pPr marL="853501" indent="0">
+              <a:buNone/>
+              <a:defRPr sz="747">
                 <a:solidFill>
                   <a:schemeClr val="tx1">
                     <a:tint val="75000"/>
@@ -917,9 +942,9 @@
                 </a:solidFill>
               </a:defRPr>
             </a:lvl5pPr>
-            <a:lvl6pPr marL="1524076" indent="0">
-              <a:buNone/>
-              <a:defRPr sz="1067">
+            <a:lvl6pPr marL="1066876" indent="0">
+              <a:buNone/>
+              <a:defRPr sz="747">
                 <a:solidFill>
                   <a:schemeClr val="tx1">
                     <a:tint val="75000"/>
@@ -927,9 +952,9 @@
                 </a:solidFill>
               </a:defRPr>
             </a:lvl6pPr>
-            <a:lvl7pPr marL="1828891" indent="0">
-              <a:buNone/>
-              <a:defRPr sz="1067">
+            <a:lvl7pPr marL="1280251" indent="0">
+              <a:buNone/>
+              <a:defRPr sz="747">
                 <a:solidFill>
                   <a:schemeClr val="tx1">
                     <a:tint val="75000"/>
@@ -937,9 +962,9 @@
                 </a:solidFill>
               </a:defRPr>
             </a:lvl7pPr>
-            <a:lvl8pPr marL="2133707" indent="0">
-              <a:buNone/>
-              <a:defRPr sz="1067">
+            <a:lvl8pPr marL="1493627" indent="0">
+              <a:buNone/>
+              <a:defRPr sz="747">
                 <a:solidFill>
                   <a:schemeClr val="tx1">
                     <a:tint val="75000"/>
@@ -947,9 +972,9 @@
                 </a:solidFill>
               </a:defRPr>
             </a:lvl8pPr>
-            <a:lvl9pPr marL="2438522" indent="0">
-              <a:buNone/>
-              <a:defRPr sz="1067">
+            <a:lvl9pPr marL="1707002" indent="0">
+              <a:buNone/>
+              <a:defRPr sz="747">
                 <a:solidFill>
                   <a:schemeClr val="tx1">
                     <a:tint val="75000"/>
@@ -961,8 +986,8 @@
           <a:p>
             <a:pPr lvl="0"/>
             <a:r>
-              <a:rPr lang="en-US" smtClean="0"/>
-              <a:t>Click to edit Master text styles</a:t>
+              <a:rPr lang="en-US"/>
+              <a:t>Edit Master text styles</a:t>
             </a:r>
           </a:p>
         </p:txBody>
@@ -984,7 +1009,7 @@
           <a:p>
             <a:fld id="{49B0FEE6-A755-164F-8F3C-12C9C2B69E35}" type="datetimeFigureOut">
               <a:rPr lang="en-US" smtClean="0"/>
-              <a:t>11/3/17</a:t>
+              <a:t>2/10/18</a:t>
             </a:fld>
             <a:endParaRPr lang="en-US"/>
           </a:p>
@@ -1033,6 +1058,11 @@
         </p:txBody>
       </p:sp>
     </p:spTree>
+    <p:extLst>
+      <p:ext uri="{BB962C8B-B14F-4D97-AF65-F5344CB8AC3E}">
+        <p14:creationId xmlns:p14="http://schemas.microsoft.com/office/powerpoint/2010/main" val="4115478651"/>
+      </p:ext>
+    </p:extLst>
   </p:cSld>
   <p:clrMapOvr>
     <a:masterClrMapping/>
@@ -1073,7 +1103,7 @@
           <a:lstStyle/>
           <a:p>
             <a:r>
-              <a:rPr lang="en-US" smtClean="0"/>
+              <a:rPr lang="en-US"/>
               <a:t>Click to edit Master title style</a:t>
             </a:r>
             <a:endParaRPr lang="en-US" dirty="0"/>
@@ -1092,8 +1122,8 @@
         </p:nvSpPr>
         <p:spPr>
           <a:xfrm>
-            <a:off x="691515" y="1217083"/>
-            <a:ext cx="4274820" cy="2900892"/>
+            <a:off x="691515" y="851959"/>
+            <a:ext cx="4274820" cy="2030624"/>
           </a:xfrm>
         </p:spPr>
         <p:txBody>
@@ -1102,35 +1132,35 @@
           <a:p>
             <a:pPr lvl="0"/>
             <a:r>
-              <a:rPr lang="en-US" smtClean="0"/>
-              <a:t>Click to edit Master text styles</a:t>
+              <a:rPr lang="en-US"/>
+              <a:t>Edit Master text styles</a:t>
             </a:r>
           </a:p>
           <a:p>
             <a:pPr lvl="1"/>
             <a:r>
-              <a:rPr lang="en-US" smtClean="0"/>
+              <a:rPr lang="en-US"/>
               <a:t>Second level</a:t>
             </a:r>
           </a:p>
           <a:p>
             <a:pPr lvl="2"/>
             <a:r>
-              <a:rPr lang="en-US" smtClean="0"/>
+              <a:rPr lang="en-US"/>
               <a:t>Third level</a:t>
             </a:r>
           </a:p>
           <a:p>
             <a:pPr lvl="3"/>
             <a:r>
-              <a:rPr lang="en-US" smtClean="0"/>
+              <a:rPr lang="en-US"/>
               <a:t>Fourth level</a:t>
             </a:r>
           </a:p>
           <a:p>
             <a:pPr lvl="4"/>
             <a:r>
-              <a:rPr lang="en-US" smtClean="0"/>
+              <a:rPr lang="en-US"/>
               <a:t>Fifth level</a:t>
             </a:r>
             <a:endParaRPr lang="en-US" dirty="0"/>
@@ -1149,8 +1179,8 @@
         </p:nvSpPr>
         <p:spPr>
           <a:xfrm>
-            <a:off x="5092065" y="1217083"/>
-            <a:ext cx="4274820" cy="2900892"/>
+            <a:off x="5092065" y="851959"/>
+            <a:ext cx="4274820" cy="2030624"/>
           </a:xfrm>
         </p:spPr>
         <p:txBody>
@@ -1159,35 +1189,35 @@
           <a:p>
             <a:pPr lvl="0"/>
             <a:r>
-              <a:rPr lang="en-US" smtClean="0"/>
-              <a:t>Click to edit Master text styles</a:t>
+              <a:rPr lang="en-US"/>
+              <a:t>Edit Master text styles</a:t>
             </a:r>
           </a:p>
           <a:p>
             <a:pPr lvl="1"/>
             <a:r>
-              <a:rPr lang="en-US" smtClean="0"/>
+              <a:rPr lang="en-US"/>
               <a:t>Second level</a:t>
             </a:r>
           </a:p>
           <a:p>
             <a:pPr lvl="2"/>
             <a:r>
-              <a:rPr lang="en-US" smtClean="0"/>
+              <a:rPr lang="en-US"/>
               <a:t>Third level</a:t>
             </a:r>
           </a:p>
           <a:p>
             <a:pPr lvl="3"/>
             <a:r>
-              <a:rPr lang="en-US" smtClean="0"/>
+              <a:rPr lang="en-US"/>
               <a:t>Fourth level</a:t>
             </a:r>
           </a:p>
           <a:p>
             <a:pPr lvl="4"/>
             <a:r>
-              <a:rPr lang="en-US" smtClean="0"/>
+              <a:rPr lang="en-US"/>
               <a:t>Fifth level</a:t>
             </a:r>
             <a:endParaRPr lang="en-US" dirty="0"/>
@@ -1211,7 +1241,7 @@
           <a:p>
             <a:fld id="{49B0FEE6-A755-164F-8F3C-12C9C2B69E35}" type="datetimeFigureOut">
               <a:rPr lang="en-US" smtClean="0"/>
-              <a:t>11/3/17</a:t>
+              <a:t>2/10/18</a:t>
             </a:fld>
             <a:endParaRPr lang="en-US"/>
           </a:p>
@@ -1260,6 +1290,11 @@
         </p:txBody>
       </p:sp>
     </p:spTree>
+    <p:extLst>
+      <p:ext uri="{BB962C8B-B14F-4D97-AF65-F5344CB8AC3E}">
+        <p14:creationId xmlns:p14="http://schemas.microsoft.com/office/powerpoint/2010/main" val="1754175304"/>
+      </p:ext>
+    </p:extLst>
   </p:cSld>
   <p:clrMapOvr>
     <a:masterClrMapping/>
@@ -1296,16 +1331,16 @@
         </p:nvSpPr>
         <p:spPr>
           <a:xfrm>
-            <a:off x="692825" y="243417"/>
-            <a:ext cx="8675370" cy="883709"/>
-          </a:xfrm>
-        </p:spPr>
-        <p:txBody>
-          <a:bodyPr/>
-          <a:lstStyle/>
-          <a:p>
-            <a:r>
-              <a:rPr lang="en-US" smtClean="0"/>
+            <a:off x="692825" y="170392"/>
+            <a:ext cx="8675370" cy="618596"/>
+          </a:xfrm>
+        </p:spPr>
+        <p:txBody>
+          <a:bodyPr/>
+          <a:lstStyle/>
+          <a:p>
+            <a:r>
+              <a:rPr lang="en-US"/>
               <a:t>Click to edit Master title style</a:t>
             </a:r>
             <a:endParaRPr lang="en-US" dirty="0"/>
@@ -1324,8 +1359,8 @@
         </p:nvSpPr>
         <p:spPr>
           <a:xfrm>
-            <a:off x="692826" y="1120775"/>
-            <a:ext cx="4255174" cy="549275"/>
+            <a:off x="692826" y="784543"/>
+            <a:ext cx="4255174" cy="384492"/>
           </a:xfrm>
         </p:spPr>
         <p:txBody>
@@ -1333,46 +1368,46 @@
           <a:lstStyle>
             <a:lvl1pPr marL="0" indent="0">
               <a:buNone/>
-              <a:defRPr sz="1600" b="1"/>
+              <a:defRPr sz="1120" b="1"/>
             </a:lvl1pPr>
-            <a:lvl2pPr marL="304815" indent="0">
-              <a:buNone/>
-              <a:defRPr sz="1333" b="1"/>
+            <a:lvl2pPr marL="213375" indent="0">
+              <a:buNone/>
+              <a:defRPr sz="933" b="1"/>
             </a:lvl2pPr>
-            <a:lvl3pPr marL="609630" indent="0">
-              <a:buNone/>
-              <a:defRPr sz="1200" b="1"/>
+            <a:lvl3pPr marL="426750" indent="0">
+              <a:buNone/>
+              <a:defRPr sz="840" b="1"/>
             </a:lvl3pPr>
-            <a:lvl4pPr marL="914446" indent="0">
-              <a:buNone/>
-              <a:defRPr sz="1067" b="1"/>
+            <a:lvl4pPr marL="640126" indent="0">
+              <a:buNone/>
+              <a:defRPr sz="747" b="1"/>
             </a:lvl4pPr>
-            <a:lvl5pPr marL="1219261" indent="0">
-              <a:buNone/>
-              <a:defRPr sz="1067" b="1"/>
+            <a:lvl5pPr marL="853501" indent="0">
+              <a:buNone/>
+              <a:defRPr sz="747" b="1"/>
             </a:lvl5pPr>
-            <a:lvl6pPr marL="1524076" indent="0">
-              <a:buNone/>
-              <a:defRPr sz="1067" b="1"/>
+            <a:lvl6pPr marL="1066876" indent="0">
+              <a:buNone/>
+              <a:defRPr sz="747" b="1"/>
             </a:lvl6pPr>
-            <a:lvl7pPr marL="1828891" indent="0">
-              <a:buNone/>
-              <a:defRPr sz="1067" b="1"/>
+            <a:lvl7pPr marL="1280251" indent="0">
+              <a:buNone/>
+              <a:defRPr sz="747" b="1"/>
             </a:lvl7pPr>
-            <a:lvl8pPr marL="2133707" indent="0">
-              <a:buNone/>
-              <a:defRPr sz="1067" b="1"/>
+            <a:lvl8pPr marL="1493627" indent="0">
+              <a:buNone/>
+              <a:defRPr sz="747" b="1"/>
             </a:lvl8pPr>
-            <a:lvl9pPr marL="2438522" indent="0">
-              <a:buNone/>
-              <a:defRPr sz="1067" b="1"/>
+            <a:lvl9pPr marL="1707002" indent="0">
+              <a:buNone/>
+              <a:defRPr sz="747" b="1"/>
             </a:lvl9pPr>
           </a:lstStyle>
           <a:p>
             <a:pPr lvl="0"/>
             <a:r>
-              <a:rPr lang="en-US" smtClean="0"/>
-              <a:t>Click to edit Master text styles</a:t>
+              <a:rPr lang="en-US"/>
+              <a:t>Edit Master text styles</a:t>
             </a:r>
           </a:p>
         </p:txBody>
@@ -1389,8 +1424,8 @@
         </p:nvSpPr>
         <p:spPr>
           <a:xfrm>
-            <a:off x="692826" y="1670050"/>
-            <a:ext cx="4255174" cy="2456392"/>
+            <a:off x="692826" y="1169035"/>
+            <a:ext cx="4255174" cy="1719474"/>
           </a:xfrm>
         </p:spPr>
         <p:txBody>
@@ -1399,35 +1434,35 @@
           <a:p>
             <a:pPr lvl="0"/>
             <a:r>
-              <a:rPr lang="en-US" smtClean="0"/>
-              <a:t>Click to edit Master text styles</a:t>
+              <a:rPr lang="en-US"/>
+              <a:t>Edit Master text styles</a:t>
             </a:r>
           </a:p>
           <a:p>
             <a:pPr lvl="1"/>
             <a:r>
-              <a:rPr lang="en-US" smtClean="0"/>
+              <a:rPr lang="en-US"/>
               <a:t>Second level</a:t>
             </a:r>
           </a:p>
           <a:p>
             <a:pPr lvl="2"/>
             <a:r>
-              <a:rPr lang="en-US" smtClean="0"/>
+              <a:rPr lang="en-US"/>
               <a:t>Third level</a:t>
             </a:r>
           </a:p>
           <a:p>
             <a:pPr lvl="3"/>
             <a:r>
-              <a:rPr lang="en-US" smtClean="0"/>
+              <a:rPr lang="en-US"/>
               <a:t>Fourth level</a:t>
             </a:r>
           </a:p>
           <a:p>
             <a:pPr lvl="4"/>
             <a:r>
-              <a:rPr lang="en-US" smtClean="0"/>
+              <a:rPr lang="en-US"/>
               <a:t>Fifth level</a:t>
             </a:r>
             <a:endParaRPr lang="en-US" dirty="0"/>
@@ -1446,8 +1481,8 @@
         </p:nvSpPr>
         <p:spPr>
           <a:xfrm>
-            <a:off x="5092065" y="1120775"/>
-            <a:ext cx="4276130" cy="549275"/>
+            <a:off x="5092065" y="784543"/>
+            <a:ext cx="4276130" cy="384492"/>
           </a:xfrm>
         </p:spPr>
         <p:txBody>
@@ -1455,46 +1490,46 @@
           <a:lstStyle>
             <a:lvl1pPr marL="0" indent="0">
               <a:buNone/>
-              <a:defRPr sz="1600" b="1"/>
+              <a:defRPr sz="1120" b="1"/>
             </a:lvl1pPr>
-            <a:lvl2pPr marL="304815" indent="0">
-              <a:buNone/>
-              <a:defRPr sz="1333" b="1"/>
+            <a:lvl2pPr marL="213375" indent="0">
+              <a:buNone/>
+              <a:defRPr sz="933" b="1"/>
             </a:lvl2pPr>
-            <a:lvl3pPr marL="609630" indent="0">
-              <a:buNone/>
-              <a:defRPr sz="1200" b="1"/>
+            <a:lvl3pPr marL="426750" indent="0">
+              <a:buNone/>
+              <a:defRPr sz="840" b="1"/>
             </a:lvl3pPr>
-            <a:lvl4pPr marL="914446" indent="0">
-              <a:buNone/>
-              <a:defRPr sz="1067" b="1"/>
+            <a:lvl4pPr marL="640126" indent="0">
+              <a:buNone/>
+              <a:defRPr sz="747" b="1"/>
             </a:lvl4pPr>
-            <a:lvl5pPr marL="1219261" indent="0">
-              <a:buNone/>
-              <a:defRPr sz="1067" b="1"/>
+            <a:lvl5pPr marL="853501" indent="0">
+              <a:buNone/>
+              <a:defRPr sz="747" b="1"/>
             </a:lvl5pPr>
-            <a:lvl6pPr marL="1524076" indent="0">
-              <a:buNone/>
-              <a:defRPr sz="1067" b="1"/>
+            <a:lvl6pPr marL="1066876" indent="0">
+              <a:buNone/>
+              <a:defRPr sz="747" b="1"/>
             </a:lvl6pPr>
-            <a:lvl7pPr marL="1828891" indent="0">
-              <a:buNone/>
-              <a:defRPr sz="1067" b="1"/>
+            <a:lvl7pPr marL="1280251" indent="0">
+              <a:buNone/>
+              <a:defRPr sz="747" b="1"/>
             </a:lvl7pPr>
-            <a:lvl8pPr marL="2133707" indent="0">
-              <a:buNone/>
-              <a:defRPr sz="1067" b="1"/>
+            <a:lvl8pPr marL="1493627" indent="0">
+              <a:buNone/>
+              <a:defRPr sz="747" b="1"/>
             </a:lvl8pPr>
-            <a:lvl9pPr marL="2438522" indent="0">
-              <a:buNone/>
-              <a:defRPr sz="1067" b="1"/>
+            <a:lvl9pPr marL="1707002" indent="0">
+              <a:buNone/>
+              <a:defRPr sz="747" b="1"/>
             </a:lvl9pPr>
           </a:lstStyle>
           <a:p>
             <a:pPr lvl="0"/>
             <a:r>
-              <a:rPr lang="en-US" smtClean="0"/>
-              <a:t>Click to edit Master text styles</a:t>
+              <a:rPr lang="en-US"/>
+              <a:t>Edit Master text styles</a:t>
             </a:r>
           </a:p>
         </p:txBody>
@@ -1511,8 +1546,8 @@
         </p:nvSpPr>
         <p:spPr>
           <a:xfrm>
-            <a:off x="5092065" y="1670050"/>
-            <a:ext cx="4276130" cy="2456392"/>
+            <a:off x="5092065" y="1169035"/>
+            <a:ext cx="4276130" cy="1719474"/>
           </a:xfrm>
         </p:spPr>
         <p:txBody>
@@ -1521,35 +1556,35 @@
           <a:p>
             <a:pPr lvl="0"/>
             <a:r>
-              <a:rPr lang="en-US" smtClean="0"/>
-              <a:t>Click to edit Master text styles</a:t>
+              <a:rPr lang="en-US"/>
+              <a:t>Edit Master text styles</a:t>
             </a:r>
           </a:p>
           <a:p>
             <a:pPr lvl="1"/>
             <a:r>
-              <a:rPr lang="en-US" smtClean="0"/>
+              <a:rPr lang="en-US"/>
               <a:t>Second level</a:t>
             </a:r>
           </a:p>
           <a:p>
             <a:pPr lvl="2"/>
             <a:r>
-              <a:rPr lang="en-US" smtClean="0"/>
+              <a:rPr lang="en-US"/>
               <a:t>Third level</a:t>
             </a:r>
           </a:p>
           <a:p>
             <a:pPr lvl="3"/>
             <a:r>
-              <a:rPr lang="en-US" smtClean="0"/>
+              <a:rPr lang="en-US"/>
               <a:t>Fourth level</a:t>
             </a:r>
           </a:p>
           <a:p>
             <a:pPr lvl="4"/>
             <a:r>
-              <a:rPr lang="en-US" smtClean="0"/>
+              <a:rPr lang="en-US"/>
               <a:t>Fifth level</a:t>
             </a:r>
             <a:endParaRPr lang="en-US" dirty="0"/>
@@ -1573,7 +1608,7 @@
           <a:p>
             <a:fld id="{49B0FEE6-A755-164F-8F3C-12C9C2B69E35}" type="datetimeFigureOut">
               <a:rPr lang="en-US" smtClean="0"/>
-              <a:t>11/3/17</a:t>
+              <a:t>2/10/18</a:t>
             </a:fld>
             <a:endParaRPr lang="en-US"/>
           </a:p>
@@ -1622,6 +1657,11 @@
         </p:txBody>
       </p:sp>
     </p:spTree>
+    <p:extLst>
+      <p:ext uri="{BB962C8B-B14F-4D97-AF65-F5344CB8AC3E}">
+        <p14:creationId xmlns:p14="http://schemas.microsoft.com/office/powerpoint/2010/main" val="1170696447"/>
+      </p:ext>
+    </p:extLst>
   </p:cSld>
   <p:clrMapOvr>
     <a:masterClrMapping/>
@@ -1662,7 +1702,7 @@
           <a:lstStyle/>
           <a:p>
             <a:r>
-              <a:rPr lang="en-US" smtClean="0"/>
+              <a:rPr lang="en-US"/>
               <a:t>Click to edit Master title style</a:t>
             </a:r>
             <a:endParaRPr lang="en-US" dirty="0"/>
@@ -1686,7 +1726,7 @@
           <a:p>
             <a:fld id="{49B0FEE6-A755-164F-8F3C-12C9C2B69E35}" type="datetimeFigureOut">
               <a:rPr lang="en-US" smtClean="0"/>
-              <a:t>11/3/17</a:t>
+              <a:t>2/10/18</a:t>
             </a:fld>
             <a:endParaRPr lang="en-US"/>
           </a:p>
@@ -1735,6 +1775,11 @@
         </p:txBody>
       </p:sp>
     </p:spTree>
+    <p:extLst>
+      <p:ext uri="{BB962C8B-B14F-4D97-AF65-F5344CB8AC3E}">
+        <p14:creationId xmlns:p14="http://schemas.microsoft.com/office/powerpoint/2010/main" val="1522561809"/>
+      </p:ext>
+    </p:extLst>
   </p:cSld>
   <p:clrMapOvr>
     <a:masterClrMapping/>
@@ -1776,7 +1821,7 @@
           <a:p>
             <a:fld id="{49B0FEE6-A755-164F-8F3C-12C9C2B69E35}" type="datetimeFigureOut">
               <a:rPr lang="en-US" smtClean="0"/>
-              <a:t>11/3/17</a:t>
+              <a:t>2/10/18</a:t>
             </a:fld>
             <a:endParaRPr lang="en-US"/>
           </a:p>
@@ -1825,6 +1870,11 @@
         </p:txBody>
       </p:sp>
     </p:spTree>
+    <p:extLst>
+      <p:ext uri="{BB962C8B-B14F-4D97-AF65-F5344CB8AC3E}">
+        <p14:creationId xmlns:p14="http://schemas.microsoft.com/office/powerpoint/2010/main" val="1216029266"/>
+      </p:ext>
+    </p:extLst>
   </p:cSld>
   <p:clrMapOvr>
     <a:masterClrMapping/>
@@ -1861,20 +1911,20 @@
         </p:nvSpPr>
         <p:spPr>
           <a:xfrm>
-            <a:off x="692825" y="304800"/>
-            <a:ext cx="3244096" cy="1066800"/>
+            <a:off x="692825" y="213360"/>
+            <a:ext cx="3244096" cy="746760"/>
           </a:xfrm>
         </p:spPr>
         <p:txBody>
           <a:bodyPr anchor="b"/>
           <a:lstStyle>
             <a:lvl1pPr>
-              <a:defRPr sz="2133"/>
+              <a:defRPr sz="1493"/>
             </a:lvl1pPr>
           </a:lstStyle>
           <a:p>
             <a:r>
-              <a:rPr lang="en-US" smtClean="0"/>
+              <a:rPr lang="en-US"/>
               <a:t>Click to edit Master title style</a:t>
             </a:r>
             <a:endParaRPr lang="en-US" dirty="0"/>
@@ -1893,73 +1943,73 @@
         </p:nvSpPr>
         <p:spPr>
           <a:xfrm>
-            <a:off x="4276130" y="658284"/>
-            <a:ext cx="5092065" cy="3249083"/>
+            <a:off x="4276130" y="460799"/>
+            <a:ext cx="5092065" cy="2274358"/>
           </a:xfrm>
         </p:spPr>
         <p:txBody>
           <a:bodyPr/>
           <a:lstStyle>
             <a:lvl1pPr>
-              <a:defRPr sz="2133"/>
+              <a:defRPr sz="1493"/>
             </a:lvl1pPr>
             <a:lvl2pPr>
-              <a:defRPr sz="1867"/>
+              <a:defRPr sz="1307"/>
             </a:lvl2pPr>
             <a:lvl3pPr>
-              <a:defRPr sz="1600"/>
+              <a:defRPr sz="1120"/>
             </a:lvl3pPr>
             <a:lvl4pPr>
-              <a:defRPr sz="1333"/>
+              <a:defRPr sz="933"/>
             </a:lvl4pPr>
             <a:lvl5pPr>
-              <a:defRPr sz="1333"/>
+              <a:defRPr sz="933"/>
             </a:lvl5pPr>
             <a:lvl6pPr>
-              <a:defRPr sz="1333"/>
+              <a:defRPr sz="933"/>
             </a:lvl6pPr>
             <a:lvl7pPr>
-              <a:defRPr sz="1333"/>
+              <a:defRPr sz="933"/>
             </a:lvl7pPr>
             <a:lvl8pPr>
-              <a:defRPr sz="1333"/>
+              <a:defRPr sz="933"/>
             </a:lvl8pPr>
             <a:lvl9pPr>
-              <a:defRPr sz="1333"/>
+              <a:defRPr sz="933"/>
             </a:lvl9pPr>
           </a:lstStyle>
           <a:p>
             <a:pPr lvl="0"/>
             <a:r>
-              <a:rPr lang="en-US" smtClean="0"/>
-              <a:t>Click to edit Master text styles</a:t>
+              <a:rPr lang="en-US"/>
+              <a:t>Edit Master text styles</a:t>
             </a:r>
           </a:p>
           <a:p>
             <a:pPr lvl="1"/>
             <a:r>
-              <a:rPr lang="en-US" smtClean="0"/>
+              <a:rPr lang="en-US"/>
               <a:t>Second level</a:t>
             </a:r>
           </a:p>
           <a:p>
             <a:pPr lvl="2"/>
             <a:r>
-              <a:rPr lang="en-US" smtClean="0"/>
+              <a:rPr lang="en-US"/>
               <a:t>Third level</a:t>
             </a:r>
           </a:p>
           <a:p>
             <a:pPr lvl="3"/>
             <a:r>
-              <a:rPr lang="en-US" smtClean="0"/>
+              <a:rPr lang="en-US"/>
               <a:t>Fourth level</a:t>
             </a:r>
           </a:p>
           <a:p>
             <a:pPr lvl="4"/>
             <a:r>
-              <a:rPr lang="en-US" smtClean="0"/>
+              <a:rPr lang="en-US"/>
               <a:t>Fifth level</a:t>
             </a:r>
             <a:endParaRPr lang="en-US" dirty="0"/>
@@ -1978,8 +2028,8 @@
         </p:nvSpPr>
         <p:spPr>
           <a:xfrm>
-            <a:off x="692825" y="1371600"/>
-            <a:ext cx="3244096" cy="2541059"/>
+            <a:off x="692825" y="960120"/>
+            <a:ext cx="3244096" cy="1778741"/>
           </a:xfrm>
         </p:spPr>
         <p:txBody>
@@ -1987,46 +2037,46 @@
           <a:lstStyle>
             <a:lvl1pPr marL="0" indent="0">
               <a:buNone/>
-              <a:defRPr sz="1067"/>
+              <a:defRPr sz="747"/>
             </a:lvl1pPr>
-            <a:lvl2pPr marL="304815" indent="0">
-              <a:buNone/>
-              <a:defRPr sz="933"/>
+            <a:lvl2pPr marL="213375" indent="0">
+              <a:buNone/>
+              <a:defRPr sz="653"/>
             </a:lvl2pPr>
-            <a:lvl3pPr marL="609630" indent="0">
-              <a:buNone/>
-              <a:defRPr sz="800"/>
+            <a:lvl3pPr marL="426750" indent="0">
+              <a:buNone/>
+              <a:defRPr sz="560"/>
             </a:lvl3pPr>
-            <a:lvl4pPr marL="914446" indent="0">
-              <a:buNone/>
-              <a:defRPr sz="667"/>
+            <a:lvl4pPr marL="640126" indent="0">
+              <a:buNone/>
+              <a:defRPr sz="467"/>
             </a:lvl4pPr>
-            <a:lvl5pPr marL="1219261" indent="0">
-              <a:buNone/>
-              <a:defRPr sz="667"/>
+            <a:lvl5pPr marL="853501" indent="0">
+              <a:buNone/>
+              <a:defRPr sz="467"/>
             </a:lvl5pPr>
-            <a:lvl6pPr marL="1524076" indent="0">
-              <a:buNone/>
-              <a:defRPr sz="667"/>
+            <a:lvl6pPr marL="1066876" indent="0">
+              <a:buNone/>
+              <a:defRPr sz="467"/>
             </a:lvl6pPr>
-            <a:lvl7pPr marL="1828891" indent="0">
-              <a:buNone/>
-              <a:defRPr sz="667"/>
+            <a:lvl7pPr marL="1280251" indent="0">
+              <a:buNone/>
+              <a:defRPr sz="467"/>
             </a:lvl7pPr>
-            <a:lvl8pPr marL="2133707" indent="0">
-              <a:buNone/>
-              <a:defRPr sz="667"/>
+            <a:lvl8pPr marL="1493627" indent="0">
+              <a:buNone/>
+              <a:defRPr sz="467"/>
             </a:lvl8pPr>
-            <a:lvl9pPr marL="2438522" indent="0">
-              <a:buNone/>
-              <a:defRPr sz="667"/>
+            <a:lvl9pPr marL="1707002" indent="0">
+              <a:buNone/>
+              <a:defRPr sz="467"/>
             </a:lvl9pPr>
           </a:lstStyle>
           <a:p>
             <a:pPr lvl="0"/>
             <a:r>
-              <a:rPr lang="en-US" smtClean="0"/>
-              <a:t>Click to edit Master text styles</a:t>
+              <a:rPr lang="en-US"/>
+              <a:t>Edit Master text styles</a:t>
             </a:r>
           </a:p>
         </p:txBody>
@@ -2048,7 +2098,7 @@
           <a:p>
             <a:fld id="{49B0FEE6-A755-164F-8F3C-12C9C2B69E35}" type="datetimeFigureOut">
               <a:rPr lang="en-US" smtClean="0"/>
-              <a:t>11/3/17</a:t>
+              <a:t>2/10/18</a:t>
             </a:fld>
             <a:endParaRPr lang="en-US"/>
           </a:p>
@@ -2097,6 +2147,11 @@
         </p:txBody>
       </p:sp>
     </p:spTree>
+    <p:extLst>
+      <p:ext uri="{BB962C8B-B14F-4D97-AF65-F5344CB8AC3E}">
+        <p14:creationId xmlns:p14="http://schemas.microsoft.com/office/powerpoint/2010/main" val="726153978"/>
+      </p:ext>
+    </p:extLst>
   </p:cSld>
   <p:clrMapOvr>
     <a:masterClrMapping/>
@@ -2133,20 +2188,20 @@
         </p:nvSpPr>
         <p:spPr>
           <a:xfrm>
-            <a:off x="692825" y="304800"/>
-            <a:ext cx="3244096" cy="1066800"/>
+            <a:off x="692825" y="213360"/>
+            <a:ext cx="3244096" cy="746760"/>
           </a:xfrm>
         </p:spPr>
         <p:txBody>
           <a:bodyPr anchor="b"/>
           <a:lstStyle>
             <a:lvl1pPr>
-              <a:defRPr sz="2133"/>
+              <a:defRPr sz="1493"/>
             </a:lvl1pPr>
           </a:lstStyle>
           <a:p>
             <a:r>
-              <a:rPr lang="en-US" smtClean="0"/>
+              <a:rPr lang="en-US"/>
               <a:t>Click to edit Master title style</a:t>
             </a:r>
             <a:endParaRPr lang="en-US" dirty="0"/>
@@ -2165,8 +2220,8 @@
         </p:nvSpPr>
         <p:spPr>
           <a:xfrm>
-            <a:off x="4276130" y="658284"/>
-            <a:ext cx="5092065" cy="3249083"/>
+            <a:off x="4276130" y="460799"/>
+            <a:ext cx="5092065" cy="2274358"/>
           </a:xfrm>
         </p:spPr>
         <p:txBody>
@@ -2174,45 +2229,45 @@
           <a:lstStyle>
             <a:lvl1pPr marL="0" indent="0">
               <a:buNone/>
-              <a:defRPr sz="2133"/>
+              <a:defRPr sz="1493"/>
             </a:lvl1pPr>
-            <a:lvl2pPr marL="304815" indent="0">
-              <a:buNone/>
-              <a:defRPr sz="1867"/>
+            <a:lvl2pPr marL="213375" indent="0">
+              <a:buNone/>
+              <a:defRPr sz="1307"/>
             </a:lvl2pPr>
-            <a:lvl3pPr marL="609630" indent="0">
-              <a:buNone/>
-              <a:defRPr sz="1600"/>
+            <a:lvl3pPr marL="426750" indent="0">
+              <a:buNone/>
+              <a:defRPr sz="1120"/>
             </a:lvl3pPr>
-            <a:lvl4pPr marL="914446" indent="0">
-              <a:buNone/>
-              <a:defRPr sz="1333"/>
+            <a:lvl4pPr marL="640126" indent="0">
+              <a:buNone/>
+              <a:defRPr sz="933"/>
             </a:lvl4pPr>
-            <a:lvl5pPr marL="1219261" indent="0">
-              <a:buNone/>
-              <a:defRPr sz="1333"/>
+            <a:lvl5pPr marL="853501" indent="0">
+              <a:buNone/>
+              <a:defRPr sz="933"/>
             </a:lvl5pPr>
-            <a:lvl6pPr marL="1524076" indent="0">
-              <a:buNone/>
-              <a:defRPr sz="1333"/>
+            <a:lvl6pPr marL="1066876" indent="0">
+              <a:buNone/>
+              <a:defRPr sz="933"/>
             </a:lvl6pPr>
-            <a:lvl7pPr marL="1828891" indent="0">
-              <a:buNone/>
-              <a:defRPr sz="1333"/>
+            <a:lvl7pPr marL="1280251" indent="0">
+              <a:buNone/>
+              <a:defRPr sz="933"/>
             </a:lvl7pPr>
-            <a:lvl8pPr marL="2133707" indent="0">
-              <a:buNone/>
-              <a:defRPr sz="1333"/>
+            <a:lvl8pPr marL="1493627" indent="0">
+              <a:buNone/>
+              <a:defRPr sz="933"/>
             </a:lvl8pPr>
-            <a:lvl9pPr marL="2438522" indent="0">
-              <a:buNone/>
-              <a:defRPr sz="1333"/>
+            <a:lvl9pPr marL="1707002" indent="0">
+              <a:buNone/>
+              <a:defRPr sz="933"/>
             </a:lvl9pPr>
           </a:lstStyle>
           <a:p>
             <a:r>
-              <a:rPr lang="en-US" smtClean="0"/>
-              <a:t>Drag picture to placeholder or click icon to add</a:t>
+              <a:rPr lang="en-US"/>
+              <a:t>Click icon to add picture</a:t>
             </a:r>
             <a:endParaRPr lang="en-US" dirty="0"/>
           </a:p>
@@ -2230,8 +2285,8 @@
         </p:nvSpPr>
         <p:spPr>
           <a:xfrm>
-            <a:off x="692825" y="1371600"/>
-            <a:ext cx="3244096" cy="2541059"/>
+            <a:off x="692825" y="960120"/>
+            <a:ext cx="3244096" cy="1778741"/>
           </a:xfrm>
         </p:spPr>
         <p:txBody>
@@ -2239,46 +2294,46 @@
           <a:lstStyle>
             <a:lvl1pPr marL="0" indent="0">
               <a:buNone/>
-              <a:defRPr sz="1067"/>
+              <a:defRPr sz="747"/>
             </a:lvl1pPr>
-            <a:lvl2pPr marL="304815" indent="0">
-              <a:buNone/>
-              <a:defRPr sz="933"/>
+            <a:lvl2pPr marL="213375" indent="0">
+              <a:buNone/>
+              <a:defRPr sz="653"/>
             </a:lvl2pPr>
-            <a:lvl3pPr marL="609630" indent="0">
-              <a:buNone/>
-              <a:defRPr sz="800"/>
+            <a:lvl3pPr marL="426750" indent="0">
+              <a:buNone/>
+              <a:defRPr sz="560"/>
             </a:lvl3pPr>
-            <a:lvl4pPr marL="914446" indent="0">
-              <a:buNone/>
-              <a:defRPr sz="667"/>
+            <a:lvl4pPr marL="640126" indent="0">
+              <a:buNone/>
+              <a:defRPr sz="467"/>
             </a:lvl4pPr>
-            <a:lvl5pPr marL="1219261" indent="0">
-              <a:buNone/>
-              <a:defRPr sz="667"/>
+            <a:lvl5pPr marL="853501" indent="0">
+              <a:buNone/>
+              <a:defRPr sz="467"/>
             </a:lvl5pPr>
-            <a:lvl6pPr marL="1524076" indent="0">
-              <a:buNone/>
-              <a:defRPr sz="667"/>
+            <a:lvl6pPr marL="1066876" indent="0">
+              <a:buNone/>
+              <a:defRPr sz="467"/>
             </a:lvl6pPr>
-            <a:lvl7pPr marL="1828891" indent="0">
-              <a:buNone/>
-              <a:defRPr sz="667"/>
+            <a:lvl7pPr marL="1280251" indent="0">
+              <a:buNone/>
+              <a:defRPr sz="467"/>
             </a:lvl7pPr>
-            <a:lvl8pPr marL="2133707" indent="0">
-              <a:buNone/>
-              <a:defRPr sz="667"/>
+            <a:lvl8pPr marL="1493627" indent="0">
+              <a:buNone/>
+              <a:defRPr sz="467"/>
             </a:lvl8pPr>
-            <a:lvl9pPr marL="2438522" indent="0">
-              <a:buNone/>
-              <a:defRPr sz="667"/>
+            <a:lvl9pPr marL="1707002" indent="0">
+              <a:buNone/>
+              <a:defRPr sz="467"/>
             </a:lvl9pPr>
           </a:lstStyle>
           <a:p>
             <a:pPr lvl="0"/>
             <a:r>
-              <a:rPr lang="en-US" smtClean="0"/>
-              <a:t>Click to edit Master text styles</a:t>
+              <a:rPr lang="en-US"/>
+              <a:t>Edit Master text styles</a:t>
             </a:r>
           </a:p>
         </p:txBody>
@@ -2300,7 +2355,7 @@
           <a:p>
             <a:fld id="{49B0FEE6-A755-164F-8F3C-12C9C2B69E35}" type="datetimeFigureOut">
               <a:rPr lang="en-US" smtClean="0"/>
-              <a:t>11/3/17</a:t>
+              <a:t>2/10/18</a:t>
             </a:fld>
             <a:endParaRPr lang="en-US"/>
           </a:p>
@@ -2349,6 +2404,11 @@
         </p:txBody>
       </p:sp>
     </p:spTree>
+    <p:extLst>
+      <p:ext uri="{BB962C8B-B14F-4D97-AF65-F5344CB8AC3E}">
+        <p14:creationId xmlns:p14="http://schemas.microsoft.com/office/powerpoint/2010/main" val="215642167"/>
+      </p:ext>
+    </p:extLst>
   </p:cSld>
   <p:clrMapOvr>
     <a:masterClrMapping/>
@@ -2390,8 +2450,8 @@
         </p:nvSpPr>
         <p:spPr>
           <a:xfrm>
-            <a:off x="691515" y="243417"/>
-            <a:ext cx="8675370" cy="883709"/>
+            <a:off x="691515" y="170392"/>
+            <a:ext cx="8675370" cy="618596"/>
           </a:xfrm>
           <a:prstGeom prst="rect">
             <a:avLst/>
@@ -2404,7 +2464,7 @@
           <a:lstStyle/>
           <a:p>
             <a:r>
-              <a:rPr lang="en-US" smtClean="0"/>
+              <a:rPr lang="en-US"/>
               <a:t>Click to edit Master title style</a:t>
             </a:r>
             <a:endParaRPr lang="en-US" dirty="0"/>
@@ -2423,8 +2483,8 @@
         </p:nvSpPr>
         <p:spPr>
           <a:xfrm>
-            <a:off x="691515" y="1217083"/>
-            <a:ext cx="8675370" cy="2900892"/>
+            <a:off x="691515" y="851959"/>
+            <a:ext cx="8675370" cy="2030624"/>
           </a:xfrm>
           <a:prstGeom prst="rect">
             <a:avLst/>
@@ -2438,35 +2498,35 @@
           <a:p>
             <a:pPr lvl="0"/>
             <a:r>
-              <a:rPr lang="en-US" smtClean="0"/>
-              <a:t>Click to edit Master text styles</a:t>
+              <a:rPr lang="en-US"/>
+              <a:t>Edit Master text styles</a:t>
             </a:r>
           </a:p>
           <a:p>
             <a:pPr lvl="1"/>
             <a:r>
-              <a:rPr lang="en-US" smtClean="0"/>
+              <a:rPr lang="en-US"/>
               <a:t>Second level</a:t>
             </a:r>
           </a:p>
           <a:p>
             <a:pPr lvl="2"/>
             <a:r>
-              <a:rPr lang="en-US" smtClean="0"/>
+              <a:rPr lang="en-US"/>
               <a:t>Third level</a:t>
             </a:r>
           </a:p>
           <a:p>
             <a:pPr lvl="3"/>
             <a:r>
-              <a:rPr lang="en-US" smtClean="0"/>
+              <a:rPr lang="en-US"/>
               <a:t>Fourth level</a:t>
             </a:r>
           </a:p>
           <a:p>
             <a:pPr lvl="4"/>
             <a:r>
-              <a:rPr lang="en-US" smtClean="0"/>
+              <a:rPr lang="en-US"/>
               <a:t>Fifth level</a:t>
             </a:r>
             <a:endParaRPr lang="en-US" dirty="0"/>
@@ -2485,8 +2545,8 @@
         </p:nvSpPr>
         <p:spPr>
           <a:xfrm>
-            <a:off x="691515" y="4237567"/>
-            <a:ext cx="2263140" cy="243417"/>
+            <a:off x="691515" y="2966297"/>
+            <a:ext cx="2263140" cy="170392"/>
           </a:xfrm>
           <a:prstGeom prst="rect">
             <a:avLst/>
@@ -2496,7 +2556,7 @@
           <a:bodyPr vert="horz" lIns="91440" tIns="45720" rIns="91440" bIns="45720" rtlCol="0" anchor="ctr"/>
           <a:lstStyle>
             <a:lvl1pPr algn="l">
-              <a:defRPr sz="800">
+              <a:defRPr sz="560">
                 <a:solidFill>
                   <a:schemeClr val="tx1">
                     <a:tint val="75000"/>
@@ -2508,7 +2568,7 @@
           <a:p>
             <a:fld id="{49B0FEE6-A755-164F-8F3C-12C9C2B69E35}" type="datetimeFigureOut">
               <a:rPr lang="en-US" smtClean="0"/>
-              <a:t>11/3/17</a:t>
+              <a:t>2/10/18</a:t>
             </a:fld>
             <a:endParaRPr lang="en-US"/>
           </a:p>
@@ -2526,8 +2586,8 @@
         </p:nvSpPr>
         <p:spPr>
           <a:xfrm>
-            <a:off x="3331845" y="4237567"/>
-            <a:ext cx="3394710" cy="243417"/>
+            <a:off x="3331845" y="2966297"/>
+            <a:ext cx="3394710" cy="170392"/>
           </a:xfrm>
           <a:prstGeom prst="rect">
             <a:avLst/>
@@ -2537,7 +2597,7 @@
           <a:bodyPr vert="horz" lIns="91440" tIns="45720" rIns="91440" bIns="45720" rtlCol="0" anchor="ctr"/>
           <a:lstStyle>
             <a:lvl1pPr algn="ctr">
-              <a:defRPr sz="800">
+              <a:defRPr sz="560">
                 <a:solidFill>
                   <a:schemeClr val="tx1">
                     <a:tint val="75000"/>
@@ -2563,8 +2623,8 @@
         </p:nvSpPr>
         <p:spPr>
           <a:xfrm>
-            <a:off x="7103745" y="4237567"/>
-            <a:ext cx="2263140" cy="243417"/>
+            <a:off x="7103745" y="2966297"/>
+            <a:ext cx="2263140" cy="170392"/>
           </a:xfrm>
           <a:prstGeom prst="rect">
             <a:avLst/>
@@ -2574,7 +2634,7 @@
           <a:bodyPr vert="horz" lIns="91440" tIns="45720" rIns="91440" bIns="45720" rtlCol="0" anchor="ctr"/>
           <a:lstStyle>
             <a:lvl1pPr algn="r">
-              <a:defRPr sz="800">
+              <a:defRPr sz="560">
                 <a:solidFill>
                   <a:schemeClr val="tx1">
                     <a:tint val="75000"/>
@@ -2595,27 +2655,27 @@
     </p:spTree>
     <p:extLst>
       <p:ext uri="{BB962C8B-B14F-4D97-AF65-F5344CB8AC3E}">
-        <p14:creationId xmlns:p14="http://schemas.microsoft.com/office/powerpoint/2010/main" val="1896652479"/>
+        <p14:creationId xmlns:p14="http://schemas.microsoft.com/office/powerpoint/2010/main" val="2036269304"/>
       </p:ext>
     </p:extLst>
   </p:cSld>
   <p:clrMap bg1="lt1" tx1="dk1" bg2="lt2" tx2="dk2" accent1="accent1" accent2="accent2" accent3="accent3" accent4="accent4" accent5="accent5" accent6="accent6" hlink="hlink" folHlink="folHlink"/>
   <p:sldLayoutIdLst>
-    <p:sldLayoutId id="2147483673" r:id="rId1"/>
-    <p:sldLayoutId id="2147483674" r:id="rId2"/>
-    <p:sldLayoutId id="2147483675" r:id="rId3"/>
-    <p:sldLayoutId id="2147483676" r:id="rId4"/>
-    <p:sldLayoutId id="2147483677" r:id="rId5"/>
-    <p:sldLayoutId id="2147483678" r:id="rId6"/>
-    <p:sldLayoutId id="2147483679" r:id="rId7"/>
-    <p:sldLayoutId id="2147483680" r:id="rId8"/>
-    <p:sldLayoutId id="2147483681" r:id="rId9"/>
-    <p:sldLayoutId id="2147483682" r:id="rId10"/>
-    <p:sldLayoutId id="2147483683" r:id="rId11"/>
+    <p:sldLayoutId id="2147483685" r:id="rId1"/>
+    <p:sldLayoutId id="2147483686" r:id="rId2"/>
+    <p:sldLayoutId id="2147483687" r:id="rId3"/>
+    <p:sldLayoutId id="2147483688" r:id="rId4"/>
+    <p:sldLayoutId id="2147483689" r:id="rId5"/>
+    <p:sldLayoutId id="2147483690" r:id="rId6"/>
+    <p:sldLayoutId id="2147483691" r:id="rId7"/>
+    <p:sldLayoutId id="2147483692" r:id="rId8"/>
+    <p:sldLayoutId id="2147483693" r:id="rId9"/>
+    <p:sldLayoutId id="2147483694" r:id="rId10"/>
+    <p:sldLayoutId id="2147483695" r:id="rId11"/>
   </p:sldLayoutIdLst>
   <p:txStyles>
     <p:titleStyle>
-      <a:lvl1pPr algn="l" defTabSz="609630" rtl="0" eaLnBrk="1" latinLnBrk="0" hangingPunct="1">
+      <a:lvl1pPr algn="l" defTabSz="426750" rtl="0" eaLnBrk="1" latinLnBrk="0" hangingPunct="1">
         <a:lnSpc>
           <a:spcPct val="90000"/>
         </a:lnSpc>
@@ -2623,7 +2683,7 @@
           <a:spcPct val="0"/>
         </a:spcBef>
         <a:buNone/>
-        <a:defRPr sz="2933" kern="1200">
+        <a:defRPr sz="2053" kern="1200">
           <a:solidFill>
             <a:schemeClr val="tx1"/>
           </a:solidFill>
@@ -2634,16 +2694,16 @@
       </a:lvl1pPr>
     </p:titleStyle>
     <p:bodyStyle>
-      <a:lvl1pPr marL="152408" indent="-152408" algn="l" defTabSz="609630" rtl="0" eaLnBrk="1" latinLnBrk="0" hangingPunct="1">
+      <a:lvl1pPr marL="106688" indent="-106688" algn="l" defTabSz="426750" rtl="0" eaLnBrk="1" latinLnBrk="0" hangingPunct="1">
         <a:lnSpc>
           <a:spcPct val="90000"/>
         </a:lnSpc>
         <a:spcBef>
-          <a:spcPts val="667"/>
+          <a:spcPts val="467"/>
         </a:spcBef>
         <a:buFont typeface="Arial" panose="020B0604020202020204" pitchFamily="34" charset="0"/>
         <a:buChar char="•"/>
-        <a:defRPr sz="1867" kern="1200">
+        <a:defRPr sz="1307" kern="1200">
           <a:solidFill>
             <a:schemeClr val="tx1"/>
           </a:solidFill>
@@ -2652,16 +2712,16 @@
           <a:cs typeface="+mn-cs"/>
         </a:defRPr>
       </a:lvl1pPr>
-      <a:lvl2pPr marL="457223" indent="-152408" algn="l" defTabSz="609630" rtl="0" eaLnBrk="1" latinLnBrk="0" hangingPunct="1">
+      <a:lvl2pPr marL="320063" indent="-106688" algn="l" defTabSz="426750" rtl="0" eaLnBrk="1" latinLnBrk="0" hangingPunct="1">
         <a:lnSpc>
           <a:spcPct val="90000"/>
         </a:lnSpc>
         <a:spcBef>
-          <a:spcPts val="333"/>
+          <a:spcPts val="233"/>
         </a:spcBef>
         <a:buFont typeface="Arial" panose="020B0604020202020204" pitchFamily="34" charset="0"/>
         <a:buChar char="•"/>
-        <a:defRPr sz="1600" kern="1200">
+        <a:defRPr sz="1120" kern="1200">
           <a:solidFill>
             <a:schemeClr val="tx1"/>
           </a:solidFill>
@@ -2670,16 +2730,16 @@
           <a:cs typeface="+mn-cs"/>
         </a:defRPr>
       </a:lvl2pPr>
-      <a:lvl3pPr marL="762038" indent="-152408" algn="l" defTabSz="609630" rtl="0" eaLnBrk="1" latinLnBrk="0" hangingPunct="1">
+      <a:lvl3pPr marL="533438" indent="-106688" algn="l" defTabSz="426750" rtl="0" eaLnBrk="1" latinLnBrk="0" hangingPunct="1">
         <a:lnSpc>
           <a:spcPct val="90000"/>
         </a:lnSpc>
         <a:spcBef>
-          <a:spcPts val="333"/>
+          <a:spcPts val="233"/>
         </a:spcBef>
         <a:buFont typeface="Arial" panose="020B0604020202020204" pitchFamily="34" charset="0"/>
         <a:buChar char="•"/>
-        <a:defRPr sz="1333" kern="1200">
+        <a:defRPr sz="933" kern="1200">
           <a:solidFill>
             <a:schemeClr val="tx1"/>
           </a:solidFill>
@@ -2688,16 +2748,16 @@
           <a:cs typeface="+mn-cs"/>
         </a:defRPr>
       </a:lvl3pPr>
-      <a:lvl4pPr marL="1066853" indent="-152408" algn="l" defTabSz="609630" rtl="0" eaLnBrk="1" latinLnBrk="0" hangingPunct="1">
+      <a:lvl4pPr marL="746813" indent="-106688" algn="l" defTabSz="426750" rtl="0" eaLnBrk="1" latinLnBrk="0" hangingPunct="1">
         <a:lnSpc>
           <a:spcPct val="90000"/>
         </a:lnSpc>
         <a:spcBef>
-          <a:spcPts val="333"/>
+          <a:spcPts val="233"/>
         </a:spcBef>
         <a:buFont typeface="Arial" panose="020B0604020202020204" pitchFamily="34" charset="0"/>
         <a:buChar char="•"/>
-        <a:defRPr sz="1200" kern="1200">
+        <a:defRPr sz="840" kern="1200">
           <a:solidFill>
             <a:schemeClr val="tx1"/>
           </a:solidFill>
@@ -2706,16 +2766,16 @@
           <a:cs typeface="+mn-cs"/>
         </a:defRPr>
       </a:lvl4pPr>
-      <a:lvl5pPr marL="1371669" indent="-152408" algn="l" defTabSz="609630" rtl="0" eaLnBrk="1" latinLnBrk="0" hangingPunct="1">
+      <a:lvl5pPr marL="960189" indent="-106688" algn="l" defTabSz="426750" rtl="0" eaLnBrk="1" latinLnBrk="0" hangingPunct="1">
         <a:lnSpc>
           <a:spcPct val="90000"/>
         </a:lnSpc>
         <a:spcBef>
-          <a:spcPts val="333"/>
+          <a:spcPts val="233"/>
         </a:spcBef>
         <a:buFont typeface="Arial" panose="020B0604020202020204" pitchFamily="34" charset="0"/>
         <a:buChar char="•"/>
-        <a:defRPr sz="1200" kern="1200">
+        <a:defRPr sz="840" kern="1200">
           <a:solidFill>
             <a:schemeClr val="tx1"/>
           </a:solidFill>
@@ -2724,16 +2784,16 @@
           <a:cs typeface="+mn-cs"/>
         </a:defRPr>
       </a:lvl5pPr>
-      <a:lvl6pPr marL="1676484" indent="-152408" algn="l" defTabSz="609630" rtl="0" eaLnBrk="1" latinLnBrk="0" hangingPunct="1">
+      <a:lvl6pPr marL="1173564" indent="-106688" algn="l" defTabSz="426750" rtl="0" eaLnBrk="1" latinLnBrk="0" hangingPunct="1">
         <a:lnSpc>
           <a:spcPct val="90000"/>
         </a:lnSpc>
         <a:spcBef>
-          <a:spcPts val="333"/>
+          <a:spcPts val="233"/>
         </a:spcBef>
         <a:buFont typeface="Arial" panose="020B0604020202020204" pitchFamily="34" charset="0"/>
         <a:buChar char="•"/>
-        <a:defRPr sz="1200" kern="1200">
+        <a:defRPr sz="840" kern="1200">
           <a:solidFill>
             <a:schemeClr val="tx1"/>
           </a:solidFill>
@@ -2742,16 +2802,16 @@
           <a:cs typeface="+mn-cs"/>
         </a:defRPr>
       </a:lvl6pPr>
-      <a:lvl7pPr marL="1981299" indent="-152408" algn="l" defTabSz="609630" rtl="0" eaLnBrk="1" latinLnBrk="0" hangingPunct="1">
+      <a:lvl7pPr marL="1386939" indent="-106688" algn="l" defTabSz="426750" rtl="0" eaLnBrk="1" latinLnBrk="0" hangingPunct="1">
         <a:lnSpc>
           <a:spcPct val="90000"/>
         </a:lnSpc>
         <a:spcBef>
-          <a:spcPts val="333"/>
+          <a:spcPts val="233"/>
         </a:spcBef>
         <a:buFont typeface="Arial" panose="020B0604020202020204" pitchFamily="34" charset="0"/>
         <a:buChar char="•"/>
-        <a:defRPr sz="1200" kern="1200">
+        <a:defRPr sz="840" kern="1200">
           <a:solidFill>
             <a:schemeClr val="tx1"/>
           </a:solidFill>
@@ -2760,16 +2820,16 @@
           <a:cs typeface="+mn-cs"/>
         </a:defRPr>
       </a:lvl7pPr>
-      <a:lvl8pPr marL="2286114" indent="-152408" algn="l" defTabSz="609630" rtl="0" eaLnBrk="1" latinLnBrk="0" hangingPunct="1">
+      <a:lvl8pPr marL="1600314" indent="-106688" algn="l" defTabSz="426750" rtl="0" eaLnBrk="1" latinLnBrk="0" hangingPunct="1">
         <a:lnSpc>
           <a:spcPct val="90000"/>
         </a:lnSpc>
         <a:spcBef>
-          <a:spcPts val="333"/>
+          <a:spcPts val="233"/>
         </a:spcBef>
         <a:buFont typeface="Arial" panose="020B0604020202020204" pitchFamily="34" charset="0"/>
         <a:buChar char="•"/>
-        <a:defRPr sz="1200" kern="1200">
+        <a:defRPr sz="840" kern="1200">
           <a:solidFill>
             <a:schemeClr val="tx1"/>
           </a:solidFill>
@@ -2778,16 +2838,16 @@
           <a:cs typeface="+mn-cs"/>
         </a:defRPr>
       </a:lvl8pPr>
-      <a:lvl9pPr marL="2590930" indent="-152408" algn="l" defTabSz="609630" rtl="0" eaLnBrk="1" latinLnBrk="0" hangingPunct="1">
+      <a:lvl9pPr marL="1813690" indent="-106688" algn="l" defTabSz="426750" rtl="0" eaLnBrk="1" latinLnBrk="0" hangingPunct="1">
         <a:lnSpc>
           <a:spcPct val="90000"/>
         </a:lnSpc>
         <a:spcBef>
-          <a:spcPts val="333"/>
+          <a:spcPts val="233"/>
         </a:spcBef>
         <a:buFont typeface="Arial" panose="020B0604020202020204" pitchFamily="34" charset="0"/>
         <a:buChar char="•"/>
-        <a:defRPr sz="1200" kern="1200">
+        <a:defRPr sz="840" kern="1200">
           <a:solidFill>
             <a:schemeClr val="tx1"/>
           </a:solidFill>
@@ -2801,8 +2861,8 @@
       <a:defPPr>
         <a:defRPr lang="en-US"/>
       </a:defPPr>
-      <a:lvl1pPr marL="0" algn="l" defTabSz="609630" rtl="0" eaLnBrk="1" latinLnBrk="0" hangingPunct="1">
-        <a:defRPr sz="1200" kern="1200">
+      <a:lvl1pPr marL="0" algn="l" defTabSz="426750" rtl="0" eaLnBrk="1" latinLnBrk="0" hangingPunct="1">
+        <a:defRPr sz="840" kern="1200">
           <a:solidFill>
             <a:schemeClr val="tx1"/>
           </a:solidFill>
@@ -2811,8 +2871,8 @@
           <a:cs typeface="+mn-cs"/>
         </a:defRPr>
       </a:lvl1pPr>
-      <a:lvl2pPr marL="304815" algn="l" defTabSz="609630" rtl="0" eaLnBrk="1" latinLnBrk="0" hangingPunct="1">
-        <a:defRPr sz="1200" kern="1200">
+      <a:lvl2pPr marL="213375" algn="l" defTabSz="426750" rtl="0" eaLnBrk="1" latinLnBrk="0" hangingPunct="1">
+        <a:defRPr sz="840" kern="1200">
           <a:solidFill>
             <a:schemeClr val="tx1"/>
           </a:solidFill>
@@ -2821,8 +2881,8 @@
           <a:cs typeface="+mn-cs"/>
         </a:defRPr>
       </a:lvl2pPr>
-      <a:lvl3pPr marL="609630" algn="l" defTabSz="609630" rtl="0" eaLnBrk="1" latinLnBrk="0" hangingPunct="1">
-        <a:defRPr sz="1200" kern="1200">
+      <a:lvl3pPr marL="426750" algn="l" defTabSz="426750" rtl="0" eaLnBrk="1" latinLnBrk="0" hangingPunct="1">
+        <a:defRPr sz="840" kern="1200">
           <a:solidFill>
             <a:schemeClr val="tx1"/>
           </a:solidFill>
@@ -2831,8 +2891,8 @@
           <a:cs typeface="+mn-cs"/>
         </a:defRPr>
       </a:lvl3pPr>
-      <a:lvl4pPr marL="914446" algn="l" defTabSz="609630" rtl="0" eaLnBrk="1" latinLnBrk="0" hangingPunct="1">
-        <a:defRPr sz="1200" kern="1200">
+      <a:lvl4pPr marL="640126" algn="l" defTabSz="426750" rtl="0" eaLnBrk="1" latinLnBrk="0" hangingPunct="1">
+        <a:defRPr sz="840" kern="1200">
           <a:solidFill>
             <a:schemeClr val="tx1"/>
           </a:solidFill>
@@ -2841,8 +2901,8 @@
           <a:cs typeface="+mn-cs"/>
         </a:defRPr>
       </a:lvl4pPr>
-      <a:lvl5pPr marL="1219261" algn="l" defTabSz="609630" rtl="0" eaLnBrk="1" latinLnBrk="0" hangingPunct="1">
-        <a:defRPr sz="1200" kern="1200">
+      <a:lvl5pPr marL="853501" algn="l" defTabSz="426750" rtl="0" eaLnBrk="1" latinLnBrk="0" hangingPunct="1">
+        <a:defRPr sz="840" kern="1200">
           <a:solidFill>
             <a:schemeClr val="tx1"/>
           </a:solidFill>
@@ -2851,8 +2911,8 @@
           <a:cs typeface="+mn-cs"/>
         </a:defRPr>
       </a:lvl5pPr>
-      <a:lvl6pPr marL="1524076" algn="l" defTabSz="609630" rtl="0" eaLnBrk="1" latinLnBrk="0" hangingPunct="1">
-        <a:defRPr sz="1200" kern="1200">
+      <a:lvl6pPr marL="1066876" algn="l" defTabSz="426750" rtl="0" eaLnBrk="1" latinLnBrk="0" hangingPunct="1">
+        <a:defRPr sz="840" kern="1200">
           <a:solidFill>
             <a:schemeClr val="tx1"/>
           </a:solidFill>
@@ -2861,8 +2921,8 @@
           <a:cs typeface="+mn-cs"/>
         </a:defRPr>
       </a:lvl6pPr>
-      <a:lvl7pPr marL="1828891" algn="l" defTabSz="609630" rtl="0" eaLnBrk="1" latinLnBrk="0" hangingPunct="1">
-        <a:defRPr sz="1200" kern="1200">
+      <a:lvl7pPr marL="1280251" algn="l" defTabSz="426750" rtl="0" eaLnBrk="1" latinLnBrk="0" hangingPunct="1">
+        <a:defRPr sz="840" kern="1200">
           <a:solidFill>
             <a:schemeClr val="tx1"/>
           </a:solidFill>
@@ -2871,8 +2931,8 @@
           <a:cs typeface="+mn-cs"/>
         </a:defRPr>
       </a:lvl7pPr>
-      <a:lvl8pPr marL="2133707" algn="l" defTabSz="609630" rtl="0" eaLnBrk="1" latinLnBrk="0" hangingPunct="1">
-        <a:defRPr sz="1200" kern="1200">
+      <a:lvl8pPr marL="1493627" algn="l" defTabSz="426750" rtl="0" eaLnBrk="1" latinLnBrk="0" hangingPunct="1">
+        <a:defRPr sz="840" kern="1200">
           <a:solidFill>
             <a:schemeClr val="tx1"/>
           </a:solidFill>
@@ -2881,8 +2941,8 @@
           <a:cs typeface="+mn-cs"/>
         </a:defRPr>
       </a:lvl8pPr>
-      <a:lvl9pPr marL="2438522" algn="l" defTabSz="609630" rtl="0" eaLnBrk="1" latinLnBrk="0" hangingPunct="1">
-        <a:defRPr sz="1200" kern="1200">
+      <a:lvl9pPr marL="1707002" algn="l" defTabSz="426750" rtl="0" eaLnBrk="1" latinLnBrk="0" hangingPunct="1">
+        <a:defRPr sz="840" kern="1200">
           <a:solidFill>
             <a:schemeClr val="tx1"/>
           </a:solidFill>
@@ -2921,7 +2981,7 @@
         </p:nvSpPr>
         <p:spPr>
           <a:xfrm>
-            <a:off x="4359676" y="881583"/>
+            <a:off x="4278994" y="724701"/>
             <a:ext cx="1890306" cy="454806"/>
           </a:xfrm>
           <a:prstGeom prst="rect">
@@ -2979,7 +3039,7 @@
         </p:nvSpPr>
         <p:spPr>
           <a:xfrm>
-            <a:off x="1399570" y="2432039"/>
+            <a:off x="728666" y="1607751"/>
             <a:ext cx="1700184" cy="457199"/>
           </a:xfrm>
           <a:prstGeom prst="rect">
@@ -3037,7 +3097,7 @@
         </p:nvSpPr>
         <p:spPr>
           <a:xfrm>
-            <a:off x="3066563" y="1764632"/>
+            <a:off x="2692821" y="1607751"/>
             <a:ext cx="2469368" cy="457199"/>
           </a:xfrm>
           <a:prstGeom prst="rect">
@@ -3095,7 +3155,7 @@
         </p:nvSpPr>
         <p:spPr>
           <a:xfrm>
-            <a:off x="7331213" y="1764633"/>
+            <a:off x="7250532" y="1607752"/>
             <a:ext cx="2589111" cy="457199"/>
           </a:xfrm>
           <a:prstGeom prst="rect">
@@ -3153,7 +3213,7 @@
         </p:nvSpPr>
         <p:spPr>
           <a:xfrm>
-            <a:off x="5569603" y="2432040"/>
+            <a:off x="5356268" y="1602377"/>
             <a:ext cx="1700184" cy="457199"/>
           </a:xfrm>
           <a:prstGeom prst="rect">
@@ -3207,14 +3267,15 @@
         <p:nvCxnSpPr>
           <p:cNvPr id="53" name="Straight Arrow Connector 52"/>
           <p:cNvCxnSpPr>
+            <a:cxnSpLocks/>
             <a:endCxn id="49" idx="0"/>
           </p:cNvCxnSpPr>
           <p:nvPr/>
         </p:nvCxnSpPr>
         <p:spPr>
           <a:xfrm>
-            <a:off x="2249662" y="1521003"/>
-            <a:ext cx="0" cy="911034"/>
+            <a:off x="1578758" y="1361552"/>
+            <a:ext cx="0" cy="246198"/>
           </a:xfrm>
           <a:prstGeom prst="straightConnector1">
             <a:avLst/>
@@ -3244,13 +3305,15 @@
       <p:cxnSp>
         <p:nvCxnSpPr>
           <p:cNvPr id="54" name="Straight Arrow Connector 53"/>
-          <p:cNvCxnSpPr/>
+          <p:cNvCxnSpPr>
+            <a:cxnSpLocks/>
+          </p:cNvCxnSpPr>
           <p:nvPr/>
         </p:nvCxnSpPr>
         <p:spPr>
-          <a:xfrm flipH="1">
-            <a:off x="2249665" y="1518436"/>
-            <a:ext cx="6376103" cy="2569"/>
+          <a:xfrm flipH="1" flipV="1">
+            <a:off x="1578759" y="1360268"/>
+            <a:ext cx="6966329" cy="1287"/>
           </a:xfrm>
           <a:prstGeom prst="straightConnector1">
             <a:avLst/>
@@ -3287,7 +3350,7 @@
         </p:nvCxnSpPr>
         <p:spPr>
           <a:xfrm>
-            <a:off x="4301247" y="1518434"/>
+            <a:off x="3927505" y="1361552"/>
             <a:ext cx="0" cy="246196"/>
           </a:xfrm>
           <a:prstGeom prst="straightConnector1">
@@ -3325,7 +3388,7 @@
         </p:nvCxnSpPr>
         <p:spPr>
           <a:xfrm>
-            <a:off x="8625768" y="1518436"/>
+            <a:off x="8545087" y="1361555"/>
             <a:ext cx="1" cy="246197"/>
           </a:xfrm>
           <a:prstGeom prst="straightConnector1">
@@ -3357,14 +3420,15 @@
         <p:nvCxnSpPr>
           <p:cNvPr id="66" name="Straight Arrow Connector 65"/>
           <p:cNvCxnSpPr>
+            <a:cxnSpLocks/>
             <a:endCxn id="52" idx="0"/>
           </p:cNvCxnSpPr>
           <p:nvPr/>
         </p:nvCxnSpPr>
         <p:spPr>
           <a:xfrm>
-            <a:off x="6419695" y="1518434"/>
-            <a:ext cx="0" cy="913604"/>
+            <a:off x="6206360" y="1360268"/>
+            <a:ext cx="0" cy="242109"/>
           </a:xfrm>
           <a:prstGeom prst="straightConnector1">
             <a:avLst/>
@@ -3399,8 +3463,8 @@
         </p:nvSpPr>
         <p:spPr>
           <a:xfrm>
-            <a:off x="224945" y="3331180"/>
-            <a:ext cx="1700184" cy="457199"/>
+            <a:off x="405072" y="2615082"/>
+            <a:ext cx="1434495" cy="457199"/>
           </a:xfrm>
           <a:prstGeom prst="rect">
             <a:avLst/>
@@ -3457,7 +3521,7 @@
         </p:nvSpPr>
         <p:spPr>
           <a:xfrm>
-            <a:off x="2580997" y="3331180"/>
+            <a:off x="3161934" y="2615082"/>
             <a:ext cx="1700184" cy="457199"/>
           </a:xfrm>
           <a:prstGeom prst="rect">
@@ -3515,8 +3579,8 @@
         </p:nvSpPr>
         <p:spPr>
           <a:xfrm>
-            <a:off x="1399570" y="3932613"/>
-            <a:ext cx="1700184" cy="457199"/>
+            <a:off x="2035123" y="2615082"/>
+            <a:ext cx="931254" cy="457199"/>
           </a:xfrm>
           <a:prstGeom prst="rect">
             <a:avLst/>
@@ -3557,11 +3621,6 @@
               </a:rPr>
               <a:t>Ingress</a:t>
             </a:r>
-            <a:endParaRPr lang="en-US" dirty="0">
-              <a:solidFill>
-                <a:schemeClr val="tx1"/>
-              </a:solidFill>
-            </a:endParaRPr>
           </a:p>
         </p:txBody>
       </p:sp>
@@ -3575,7 +3634,7 @@
         </p:nvCxnSpPr>
         <p:spPr>
           <a:xfrm>
-            <a:off x="5304829" y="1336391"/>
+            <a:off x="5224147" y="1179510"/>
             <a:ext cx="804" cy="182045"/>
           </a:xfrm>
           <a:prstGeom prst="straightConnector1">
@@ -3607,14 +3666,15 @@
         <p:nvCxnSpPr>
           <p:cNvPr id="75" name="Straight Arrow Connector 74"/>
           <p:cNvCxnSpPr>
+            <a:cxnSpLocks/>
             <a:stCxn id="49" idx="2"/>
           </p:cNvCxnSpPr>
           <p:nvPr/>
         </p:nvCxnSpPr>
         <p:spPr>
           <a:xfrm>
-            <a:off x="2249662" y="2889238"/>
-            <a:ext cx="0" cy="225197"/>
+            <a:off x="1578758" y="2064950"/>
+            <a:ext cx="0" cy="327877"/>
           </a:xfrm>
           <a:prstGeom prst="straightConnector1">
             <a:avLst/>
@@ -3644,13 +3704,15 @@
       <p:cxnSp>
         <p:nvCxnSpPr>
           <p:cNvPr id="79" name="Straight Arrow Connector 78"/>
-          <p:cNvCxnSpPr/>
+          <p:cNvCxnSpPr>
+            <a:cxnSpLocks/>
+          </p:cNvCxnSpPr>
           <p:nvPr/>
         </p:nvCxnSpPr>
         <p:spPr>
           <a:xfrm flipH="1">
-            <a:off x="1075039" y="3108922"/>
-            <a:ext cx="2356053" cy="0"/>
+            <a:off x="1122320" y="2392826"/>
+            <a:ext cx="2889706" cy="0"/>
           </a:xfrm>
           <a:prstGeom prst="straightConnector1">
             <a:avLst/>
@@ -3687,7 +3749,7 @@
         </p:nvCxnSpPr>
         <p:spPr>
           <a:xfrm>
-            <a:off x="3431089" y="3108925"/>
+            <a:off x="4012026" y="2392827"/>
             <a:ext cx="0" cy="222255"/>
           </a:xfrm>
           <a:prstGeom prst="straightConnector1">
@@ -3719,14 +3781,15 @@
         <p:nvCxnSpPr>
           <p:cNvPr id="84" name="Straight Arrow Connector 83"/>
           <p:cNvCxnSpPr>
+            <a:cxnSpLocks/>
             <a:endCxn id="69" idx="0"/>
           </p:cNvCxnSpPr>
           <p:nvPr/>
         </p:nvCxnSpPr>
         <p:spPr>
           <a:xfrm>
-            <a:off x="1075037" y="3108922"/>
-            <a:ext cx="0" cy="222256"/>
+            <a:off x="1122319" y="2401909"/>
+            <a:ext cx="0" cy="213173"/>
           </a:xfrm>
           <a:prstGeom prst="straightConnector1">
             <a:avLst/>
@@ -3757,14 +3820,15 @@
         <p:nvCxnSpPr>
           <p:cNvPr id="88" name="Straight Arrow Connector 87"/>
           <p:cNvCxnSpPr>
+            <a:cxnSpLocks/>
             <a:endCxn id="71" idx="0"/>
           </p:cNvCxnSpPr>
           <p:nvPr/>
         </p:nvCxnSpPr>
         <p:spPr>
           <a:xfrm>
-            <a:off x="2249663" y="3108924"/>
-            <a:ext cx="1" cy="823689"/>
+            <a:off x="2500750" y="2392827"/>
+            <a:ext cx="0" cy="222255"/>
           </a:xfrm>
           <a:prstGeom prst="straightConnector1">
             <a:avLst/>
@@ -3799,8 +3863,8 @@
         </p:nvSpPr>
         <p:spPr>
           <a:xfrm>
-            <a:off x="4394978" y="3329907"/>
-            <a:ext cx="1700184" cy="457199"/>
+            <a:off x="5356269" y="2632208"/>
+            <a:ext cx="1360363" cy="457199"/>
           </a:xfrm>
           <a:prstGeom prst="rect">
             <a:avLst/>
@@ -3857,8 +3921,8 @@
         </p:nvSpPr>
         <p:spPr>
           <a:xfrm>
-            <a:off x="6751030" y="3329907"/>
-            <a:ext cx="1700184" cy="457199"/>
+            <a:off x="8070334" y="2632208"/>
+            <a:ext cx="1392165" cy="457199"/>
           </a:xfrm>
           <a:prstGeom prst="rect">
             <a:avLst/>
@@ -3915,8 +3979,8 @@
         </p:nvSpPr>
         <p:spPr>
           <a:xfrm>
-            <a:off x="5569603" y="3931340"/>
-            <a:ext cx="1700184" cy="457199"/>
+            <a:off x="6950328" y="2632208"/>
+            <a:ext cx="886308" cy="457199"/>
           </a:xfrm>
           <a:prstGeom prst="rect">
             <a:avLst/>
@@ -3957,24 +4021,21 @@
               </a:rPr>
               <a:t>Egress</a:t>
             </a:r>
-            <a:endParaRPr lang="en-US" dirty="0">
-              <a:solidFill>
-                <a:schemeClr val="tx1"/>
-              </a:solidFill>
-            </a:endParaRPr>
           </a:p>
         </p:txBody>
       </p:sp>
       <p:cxnSp>
         <p:nvCxnSpPr>
           <p:cNvPr id="94" name="Straight Arrow Connector 93"/>
-          <p:cNvCxnSpPr/>
+          <p:cNvCxnSpPr>
+            <a:cxnSpLocks/>
+          </p:cNvCxnSpPr>
           <p:nvPr/>
         </p:nvCxnSpPr>
         <p:spPr>
           <a:xfrm>
-            <a:off x="6419695" y="2887965"/>
-            <a:ext cx="0" cy="225197"/>
+            <a:off x="6202956" y="2044888"/>
+            <a:ext cx="0" cy="347938"/>
           </a:xfrm>
           <a:prstGeom prst="straightConnector1">
             <a:avLst/>
@@ -4004,13 +4065,15 @@
       <p:cxnSp>
         <p:nvCxnSpPr>
           <p:cNvPr id="95" name="Straight Arrow Connector 94"/>
-          <p:cNvCxnSpPr/>
+          <p:cNvCxnSpPr>
+            <a:cxnSpLocks/>
+          </p:cNvCxnSpPr>
           <p:nvPr/>
         </p:nvCxnSpPr>
         <p:spPr>
           <a:xfrm flipH="1">
-            <a:off x="5245072" y="3107649"/>
-            <a:ext cx="2356053" cy="0"/>
+            <a:off x="6054905" y="2392826"/>
+            <a:ext cx="2669816" cy="0"/>
           </a:xfrm>
           <a:prstGeom prst="straightConnector1">
             <a:avLst/>
@@ -4045,7 +4108,7 @@
         </p:nvCxnSpPr>
         <p:spPr>
           <a:xfrm>
-            <a:off x="7601122" y="3107652"/>
+            <a:off x="8724721" y="2392827"/>
             <a:ext cx="0" cy="222255"/>
           </a:xfrm>
           <a:prstGeom prst="straightConnector1">
@@ -4076,13 +4139,15 @@
       <p:cxnSp>
         <p:nvCxnSpPr>
           <p:cNvPr id="97" name="Straight Arrow Connector 96"/>
-          <p:cNvCxnSpPr/>
+          <p:cNvCxnSpPr>
+            <a:cxnSpLocks/>
+          </p:cNvCxnSpPr>
           <p:nvPr/>
         </p:nvCxnSpPr>
         <p:spPr>
           <a:xfrm>
-            <a:off x="5245070" y="3107649"/>
-            <a:ext cx="0" cy="222256"/>
+            <a:off x="6054904" y="2392826"/>
+            <a:ext cx="0" cy="248464"/>
           </a:xfrm>
           <a:prstGeom prst="straightConnector1">
             <a:avLst/>
@@ -4112,13 +4177,16 @@
       <p:cxnSp>
         <p:nvCxnSpPr>
           <p:cNvPr id="98" name="Straight Arrow Connector 97"/>
-          <p:cNvCxnSpPr/>
+          <p:cNvCxnSpPr>
+            <a:cxnSpLocks/>
+            <a:endCxn id="93" idx="0"/>
+          </p:cNvCxnSpPr>
           <p:nvPr/>
         </p:nvCxnSpPr>
         <p:spPr>
           <a:xfrm>
-            <a:off x="6419696" y="3107651"/>
-            <a:ext cx="1" cy="823689"/>
+            <a:off x="7393482" y="2401909"/>
+            <a:ext cx="0" cy="230299"/>
           </a:xfrm>
           <a:prstGeom prst="straightConnector1">
             <a:avLst/>
@@ -4153,7 +4221,7 @@
         </p:nvSpPr>
         <p:spPr>
           <a:xfrm>
-            <a:off x="5041662" y="237924"/>
+            <a:off x="4960981" y="81042"/>
             <a:ext cx="527943" cy="454806"/>
           </a:xfrm>
           <a:prstGeom prst="rect">
@@ -4195,11 +4263,6 @@
               </a:rPr>
               <a:t>T</a:t>
             </a:r>
-            <a:endParaRPr lang="en-US" dirty="0">
-              <a:solidFill>
-                <a:schemeClr val="tx1"/>
-              </a:solidFill>
-            </a:endParaRPr>
           </a:p>
         </p:txBody>
       </p:sp>
@@ -4211,7 +4274,7 @@
         </p:nvCxnSpPr>
         <p:spPr>
           <a:xfrm>
-            <a:off x="5304024" y="698242"/>
+            <a:off x="5223342" y="541361"/>
             <a:ext cx="804" cy="182045"/>
           </a:xfrm>
           <a:prstGeom prst="straightConnector1">

</xml_diff>